<commit_message>
Put private function online
</commit_message>
<xml_diff>
--- a/img/ppt_for_fadding.pptx
+++ b/img/ppt_for_fadding.pptx
@@ -2,12 +2,12 @@
 <file path=ppt/presentation.xml><?xml version="1.0" encoding="utf-8"?>
 <p:presentation xmlns:a="http://schemas.openxmlformats.org/drawingml/2006/main" xmlns:r="http://schemas.openxmlformats.org/officeDocument/2006/relationships" xmlns:p="http://schemas.openxmlformats.org/presentationml/2006/main" saveSubsetFonts="1" autoCompressPictures="0">
   <p:sldMasterIdLst>
-    <p:sldMasterId id="2147483648" r:id="rId1"/>
+    <p:sldMasterId id="2147483672" r:id="rId1"/>
   </p:sldMasterIdLst>
   <p:sldIdLst>
     <p:sldId id="256" r:id="rId2"/>
   </p:sldIdLst>
-  <p:sldSz cx="12192000" cy="6858000"/>
+  <p:sldSz cx="18000663" cy="6858000"/>
   <p:notesSz cx="6858000" cy="9144000"/>
   <p:defaultTextStyle>
     <a:defPPr>
@@ -104,12 +104,17 @@
       </a:defRPr>
     </a:lvl9pPr>
   </p:defaultTextStyle>
+  <p:extLst>
+    <p:ext uri="{EFAFB233-063F-42B5-8137-9DF3F51BA10A}">
+      <p15:sldGuideLst xmlns:p15="http://schemas.microsoft.com/office/powerpoint/2012/main"/>
+    </p:ext>
+  </p:extLst>
 </p:presentation>
 </file>
 
 <file path=ppt/slideLayouts/slideLayout1.xml><?xml version="1.0" encoding="utf-8"?>
 <p:sldLayout xmlns:a="http://schemas.openxmlformats.org/drawingml/2006/main" xmlns:r="http://schemas.openxmlformats.org/officeDocument/2006/relationships" xmlns:p="http://schemas.openxmlformats.org/presentationml/2006/main" type="title" preserve="1">
-  <p:cSld name="Diapositive de titre">
+  <p:cSld name="Title Slide">
     <p:spTree>
       <p:nvGrpSpPr>
         <p:cNvPr id="1" name=""/>
@@ -126,7 +131,7 @@
       </p:grpSpPr>
       <p:sp>
         <p:nvSpPr>
-          <p:cNvPr id="2" name="Titre 1"/>
+          <p:cNvPr id="2" name="Title 1"/>
           <p:cNvSpPr>
             <a:spLocks noGrp="1"/>
           </p:cNvSpPr>
@@ -136,8 +141,8 @@
         </p:nvSpPr>
         <p:spPr>
           <a:xfrm>
-            <a:off x="1524000" y="1122363"/>
-            <a:ext cx="9144000" cy="2387600"/>
+            <a:off x="2250083" y="1122363"/>
+            <a:ext cx="13500497" cy="2387600"/>
           </a:xfrm>
         </p:spPr>
         <p:txBody>
@@ -149,16 +154,16 @@
           </a:lstStyle>
           <a:p>
             <a:r>
-              <a:rPr lang="fr-FR" smtClean="0"/>
-              <a:t>Cliquez et modifiez le titre</a:t>
-            </a:r>
-            <a:endParaRPr lang="fr-FR"/>
-          </a:p>
-        </p:txBody>
-      </p:sp>
-      <p:sp>
-        <p:nvSpPr>
-          <p:cNvPr id="3" name="Sous-titre 2"/>
+              <a:rPr lang="en-US" smtClean="0"/>
+              <a:t>Click to edit Master title style</a:t>
+            </a:r>
+            <a:endParaRPr lang="en-US" dirty="0"/>
+          </a:p>
+        </p:txBody>
+      </p:sp>
+      <p:sp>
+        <p:nvSpPr>
+          <p:cNvPr id="3" name="Subtitle 2"/>
           <p:cNvSpPr>
             <a:spLocks noGrp="1"/>
           </p:cNvSpPr>
@@ -168,8 +173,8 @@
         </p:nvSpPr>
         <p:spPr>
           <a:xfrm>
-            <a:off x="1524000" y="3602038"/>
-            <a:ext cx="9144000" cy="1655762"/>
+            <a:off x="2250083" y="3602038"/>
+            <a:ext cx="13500497" cy="1655762"/>
           </a:xfrm>
         </p:spPr>
         <p:txBody>
@@ -214,16 +219,16 @@
           </a:lstStyle>
           <a:p>
             <a:r>
-              <a:rPr lang="fr-FR" smtClean="0"/>
-              <a:t>Cliquez pour modifier le style des sous-titres du masque</a:t>
-            </a:r>
-            <a:endParaRPr lang="fr-FR"/>
-          </a:p>
-        </p:txBody>
-      </p:sp>
-      <p:sp>
-        <p:nvSpPr>
-          <p:cNvPr id="4" name="Espace réservé de la date 3"/>
+              <a:rPr lang="en-US" smtClean="0"/>
+              <a:t>Click to edit Master subtitle style</a:t>
+            </a:r>
+            <a:endParaRPr lang="en-US" dirty="0"/>
+          </a:p>
+        </p:txBody>
+      </p:sp>
+      <p:sp>
+        <p:nvSpPr>
+          <p:cNvPr id="4" name="Date Placeholder 3"/>
           <p:cNvSpPr>
             <a:spLocks noGrp="1"/>
           </p:cNvSpPr>
@@ -238,7 +243,7 @@
           <a:p>
             <a:fld id="{016BF3B6-81B7-4E48-A8EE-448660641F47}" type="datetimeFigureOut">
               <a:rPr lang="fr-FR" smtClean="0"/>
-              <a:t>28/06/2018</a:t>
+              <a:t>29/06/2018</a:t>
             </a:fld>
             <a:endParaRPr lang="fr-FR"/>
           </a:p>
@@ -246,7 +251,7 @@
       </p:sp>
       <p:sp>
         <p:nvSpPr>
-          <p:cNvPr id="5" name="Espace réservé du pied de page 4"/>
+          <p:cNvPr id="5" name="Footer Placeholder 4"/>
           <p:cNvSpPr>
             <a:spLocks noGrp="1"/>
           </p:cNvSpPr>
@@ -265,7 +270,7 @@
       </p:sp>
       <p:sp>
         <p:nvSpPr>
-          <p:cNvPr id="6" name="Espace réservé du numéro de diapositive 5"/>
+          <p:cNvPr id="6" name="Slide Number Placeholder 5"/>
           <p:cNvSpPr>
             <a:spLocks noGrp="1"/>
           </p:cNvSpPr>
@@ -287,11 +292,6 @@
         </p:txBody>
       </p:sp>
     </p:spTree>
-    <p:extLst>
-      <p:ext uri="{BB962C8B-B14F-4D97-AF65-F5344CB8AC3E}">
-        <p14:creationId xmlns:p14="http://schemas.microsoft.com/office/powerpoint/2010/main" val="299405119"/>
-      </p:ext>
-    </p:extLst>
   </p:cSld>
   <p:clrMapOvr>
     <a:masterClrMapping/>
@@ -301,7 +301,7 @@
 
 <file path=ppt/slideLayouts/slideLayout10.xml><?xml version="1.0" encoding="utf-8"?>
 <p:sldLayout xmlns:a="http://schemas.openxmlformats.org/drawingml/2006/main" xmlns:r="http://schemas.openxmlformats.org/officeDocument/2006/relationships" xmlns:p="http://schemas.openxmlformats.org/presentationml/2006/main" type="vertTx" preserve="1">
-  <p:cSld name="Titre et texte vertical">
+  <p:cSld name="Title and Vertical Text">
     <p:spTree>
       <p:nvGrpSpPr>
         <p:cNvPr id="1" name=""/>
@@ -318,7 +318,7 @@
       </p:grpSpPr>
       <p:sp>
         <p:nvSpPr>
-          <p:cNvPr id="2" name="Titre 1"/>
+          <p:cNvPr id="2" name="Title 1"/>
           <p:cNvSpPr>
             <a:spLocks noGrp="1"/>
           </p:cNvSpPr>
@@ -332,16 +332,16 @@
           <a:lstStyle/>
           <a:p>
             <a:r>
-              <a:rPr lang="fr-FR" smtClean="0"/>
-              <a:t>Cliquez et modifiez le titre</a:t>
-            </a:r>
-            <a:endParaRPr lang="fr-FR"/>
-          </a:p>
-        </p:txBody>
-      </p:sp>
-      <p:sp>
-        <p:nvSpPr>
-          <p:cNvPr id="3" name="Espace réservé du texte vertical 2"/>
+              <a:rPr lang="en-US" smtClean="0"/>
+              <a:t>Click to edit Master title style</a:t>
+            </a:r>
+            <a:endParaRPr lang="en-US" dirty="0"/>
+          </a:p>
+        </p:txBody>
+      </p:sp>
+      <p:sp>
+        <p:nvSpPr>
+          <p:cNvPr id="3" name="Vertical Text Placeholder 2"/>
           <p:cNvSpPr>
             <a:spLocks noGrp="1"/>
           </p:cNvSpPr>
@@ -356,44 +356,44 @@
           <a:p>
             <a:pPr lvl="0"/>
             <a:r>
-              <a:rPr lang="fr-FR" smtClean="0"/>
-              <a:t>Cliquez pour modifier les styles du texte du masque</a:t>
+              <a:rPr lang="en-US" smtClean="0"/>
+              <a:t>Click to edit Master text styles</a:t>
             </a:r>
           </a:p>
           <a:p>
             <a:pPr lvl="1"/>
             <a:r>
-              <a:rPr lang="fr-FR" smtClean="0"/>
-              <a:t>Deuxième niveau</a:t>
+              <a:rPr lang="en-US" smtClean="0"/>
+              <a:t>Second level</a:t>
             </a:r>
           </a:p>
           <a:p>
             <a:pPr lvl="2"/>
             <a:r>
-              <a:rPr lang="fr-FR" smtClean="0"/>
-              <a:t>Troisième niveau</a:t>
+              <a:rPr lang="en-US" smtClean="0"/>
+              <a:t>Third level</a:t>
             </a:r>
           </a:p>
           <a:p>
             <a:pPr lvl="3"/>
             <a:r>
-              <a:rPr lang="fr-FR" smtClean="0"/>
-              <a:t>Quatrième niveau</a:t>
+              <a:rPr lang="en-US" smtClean="0"/>
+              <a:t>Fourth level</a:t>
             </a:r>
           </a:p>
           <a:p>
             <a:pPr lvl="4"/>
             <a:r>
-              <a:rPr lang="fr-FR" smtClean="0"/>
-              <a:t>Cinquième niveau</a:t>
-            </a:r>
-            <a:endParaRPr lang="fr-FR"/>
-          </a:p>
-        </p:txBody>
-      </p:sp>
-      <p:sp>
-        <p:nvSpPr>
-          <p:cNvPr id="4" name="Espace réservé de la date 3"/>
+              <a:rPr lang="en-US" smtClean="0"/>
+              <a:t>Fifth level</a:t>
+            </a:r>
+            <a:endParaRPr lang="en-US" dirty="0"/>
+          </a:p>
+        </p:txBody>
+      </p:sp>
+      <p:sp>
+        <p:nvSpPr>
+          <p:cNvPr id="4" name="Date Placeholder 3"/>
           <p:cNvSpPr>
             <a:spLocks noGrp="1"/>
           </p:cNvSpPr>
@@ -408,7 +408,7 @@
           <a:p>
             <a:fld id="{016BF3B6-81B7-4E48-A8EE-448660641F47}" type="datetimeFigureOut">
               <a:rPr lang="fr-FR" smtClean="0"/>
-              <a:t>28/06/2018</a:t>
+              <a:t>29/06/2018</a:t>
             </a:fld>
             <a:endParaRPr lang="fr-FR"/>
           </a:p>
@@ -416,7 +416,7 @@
       </p:sp>
       <p:sp>
         <p:nvSpPr>
-          <p:cNvPr id="5" name="Espace réservé du pied de page 4"/>
+          <p:cNvPr id="5" name="Footer Placeholder 4"/>
           <p:cNvSpPr>
             <a:spLocks noGrp="1"/>
           </p:cNvSpPr>
@@ -435,7 +435,7 @@
       </p:sp>
       <p:sp>
         <p:nvSpPr>
-          <p:cNvPr id="6" name="Espace réservé du numéro de diapositive 5"/>
+          <p:cNvPr id="6" name="Slide Number Placeholder 5"/>
           <p:cNvSpPr>
             <a:spLocks noGrp="1"/>
           </p:cNvSpPr>
@@ -457,11 +457,6 @@
         </p:txBody>
       </p:sp>
     </p:spTree>
-    <p:extLst>
-      <p:ext uri="{BB962C8B-B14F-4D97-AF65-F5344CB8AC3E}">
-        <p14:creationId xmlns:p14="http://schemas.microsoft.com/office/powerpoint/2010/main" val="532626842"/>
-      </p:ext>
-    </p:extLst>
   </p:cSld>
   <p:clrMapOvr>
     <a:masterClrMapping/>
@@ -471,7 +466,7 @@
 
 <file path=ppt/slideLayouts/slideLayout11.xml><?xml version="1.0" encoding="utf-8"?>
 <p:sldLayout xmlns:a="http://schemas.openxmlformats.org/drawingml/2006/main" xmlns:r="http://schemas.openxmlformats.org/officeDocument/2006/relationships" xmlns:p="http://schemas.openxmlformats.org/presentationml/2006/main" type="vertTitleAndTx" preserve="1">
-  <p:cSld name="Titre vertical et texte">
+  <p:cSld name="Vertical Title and Text">
     <p:spTree>
       <p:nvGrpSpPr>
         <p:cNvPr id="1" name=""/>
@@ -488,7 +483,7 @@
       </p:grpSpPr>
       <p:sp>
         <p:nvSpPr>
-          <p:cNvPr id="2" name="Titre vertical 1"/>
+          <p:cNvPr id="2" name="Vertical Title 1"/>
           <p:cNvSpPr>
             <a:spLocks noGrp="1"/>
           </p:cNvSpPr>
@@ -498,8 +493,8 @@
         </p:nvSpPr>
         <p:spPr>
           <a:xfrm>
-            <a:off x="8724900" y="365125"/>
-            <a:ext cx="2628900" cy="5811838"/>
+            <a:off x="12881724" y="365125"/>
+            <a:ext cx="3881393" cy="5811838"/>
           </a:xfrm>
         </p:spPr>
         <p:txBody>
@@ -507,16 +502,16 @@
           <a:lstStyle/>
           <a:p>
             <a:r>
-              <a:rPr lang="fr-FR" smtClean="0"/>
-              <a:t>Cliquez et modifiez le titre</a:t>
-            </a:r>
-            <a:endParaRPr lang="fr-FR"/>
-          </a:p>
-        </p:txBody>
-      </p:sp>
-      <p:sp>
-        <p:nvSpPr>
-          <p:cNvPr id="3" name="Espace réservé du texte vertical 2"/>
+              <a:rPr lang="en-US" smtClean="0"/>
+              <a:t>Click to edit Master title style</a:t>
+            </a:r>
+            <a:endParaRPr lang="en-US" dirty="0"/>
+          </a:p>
+        </p:txBody>
+      </p:sp>
+      <p:sp>
+        <p:nvSpPr>
+          <p:cNvPr id="3" name="Vertical Text Placeholder 2"/>
           <p:cNvSpPr>
             <a:spLocks noGrp="1"/>
           </p:cNvSpPr>
@@ -526,8 +521,8 @@
         </p:nvSpPr>
         <p:spPr>
           <a:xfrm>
-            <a:off x="838200" y="365125"/>
-            <a:ext cx="7734300" cy="5811838"/>
+            <a:off x="1237545" y="365125"/>
+            <a:ext cx="11419171" cy="5811838"/>
           </a:xfrm>
         </p:spPr>
         <p:txBody>
@@ -536,44 +531,44 @@
           <a:p>
             <a:pPr lvl="0"/>
             <a:r>
-              <a:rPr lang="fr-FR" smtClean="0"/>
-              <a:t>Cliquez pour modifier les styles du texte du masque</a:t>
+              <a:rPr lang="en-US" smtClean="0"/>
+              <a:t>Click to edit Master text styles</a:t>
             </a:r>
           </a:p>
           <a:p>
             <a:pPr lvl="1"/>
             <a:r>
-              <a:rPr lang="fr-FR" smtClean="0"/>
-              <a:t>Deuxième niveau</a:t>
+              <a:rPr lang="en-US" smtClean="0"/>
+              <a:t>Second level</a:t>
             </a:r>
           </a:p>
           <a:p>
             <a:pPr lvl="2"/>
             <a:r>
-              <a:rPr lang="fr-FR" smtClean="0"/>
-              <a:t>Troisième niveau</a:t>
+              <a:rPr lang="en-US" smtClean="0"/>
+              <a:t>Third level</a:t>
             </a:r>
           </a:p>
           <a:p>
             <a:pPr lvl="3"/>
             <a:r>
-              <a:rPr lang="fr-FR" smtClean="0"/>
-              <a:t>Quatrième niveau</a:t>
+              <a:rPr lang="en-US" smtClean="0"/>
+              <a:t>Fourth level</a:t>
             </a:r>
           </a:p>
           <a:p>
             <a:pPr lvl="4"/>
             <a:r>
-              <a:rPr lang="fr-FR" smtClean="0"/>
-              <a:t>Cinquième niveau</a:t>
-            </a:r>
-            <a:endParaRPr lang="fr-FR"/>
-          </a:p>
-        </p:txBody>
-      </p:sp>
-      <p:sp>
-        <p:nvSpPr>
-          <p:cNvPr id="4" name="Espace réservé de la date 3"/>
+              <a:rPr lang="en-US" smtClean="0"/>
+              <a:t>Fifth level</a:t>
+            </a:r>
+            <a:endParaRPr lang="en-US" dirty="0"/>
+          </a:p>
+        </p:txBody>
+      </p:sp>
+      <p:sp>
+        <p:nvSpPr>
+          <p:cNvPr id="4" name="Date Placeholder 3"/>
           <p:cNvSpPr>
             <a:spLocks noGrp="1"/>
           </p:cNvSpPr>
@@ -588,7 +583,7 @@
           <a:p>
             <a:fld id="{016BF3B6-81B7-4E48-A8EE-448660641F47}" type="datetimeFigureOut">
               <a:rPr lang="fr-FR" smtClean="0"/>
-              <a:t>28/06/2018</a:t>
+              <a:t>29/06/2018</a:t>
             </a:fld>
             <a:endParaRPr lang="fr-FR"/>
           </a:p>
@@ -596,7 +591,7 @@
       </p:sp>
       <p:sp>
         <p:nvSpPr>
-          <p:cNvPr id="5" name="Espace réservé du pied de page 4"/>
+          <p:cNvPr id="5" name="Footer Placeholder 4"/>
           <p:cNvSpPr>
             <a:spLocks noGrp="1"/>
           </p:cNvSpPr>
@@ -615,7 +610,7 @@
       </p:sp>
       <p:sp>
         <p:nvSpPr>
-          <p:cNvPr id="6" name="Espace réservé du numéro de diapositive 5"/>
+          <p:cNvPr id="6" name="Slide Number Placeholder 5"/>
           <p:cNvSpPr>
             <a:spLocks noGrp="1"/>
           </p:cNvSpPr>
@@ -637,11 +632,6 @@
         </p:txBody>
       </p:sp>
     </p:spTree>
-    <p:extLst>
-      <p:ext uri="{BB962C8B-B14F-4D97-AF65-F5344CB8AC3E}">
-        <p14:creationId xmlns:p14="http://schemas.microsoft.com/office/powerpoint/2010/main" val="1147492798"/>
-      </p:ext>
-    </p:extLst>
   </p:cSld>
   <p:clrMapOvr>
     <a:masterClrMapping/>
@@ -651,7 +641,7 @@
 
 <file path=ppt/slideLayouts/slideLayout2.xml><?xml version="1.0" encoding="utf-8"?>
 <p:sldLayout xmlns:a="http://schemas.openxmlformats.org/drawingml/2006/main" xmlns:r="http://schemas.openxmlformats.org/officeDocument/2006/relationships" xmlns:p="http://schemas.openxmlformats.org/presentationml/2006/main" type="obj" preserve="1">
-  <p:cSld name="Titre et contenu">
+  <p:cSld name="Title and Content">
     <p:spTree>
       <p:nvGrpSpPr>
         <p:cNvPr id="1" name=""/>
@@ -668,7 +658,7 @@
       </p:grpSpPr>
       <p:sp>
         <p:nvSpPr>
-          <p:cNvPr id="2" name="Titre 1"/>
+          <p:cNvPr id="2" name="Title 1"/>
           <p:cNvSpPr>
             <a:spLocks noGrp="1"/>
           </p:cNvSpPr>
@@ -682,16 +672,16 @@
           <a:lstStyle/>
           <a:p>
             <a:r>
-              <a:rPr lang="fr-FR" smtClean="0"/>
-              <a:t>Cliquez et modifiez le titre</a:t>
-            </a:r>
-            <a:endParaRPr lang="fr-FR"/>
-          </a:p>
-        </p:txBody>
-      </p:sp>
-      <p:sp>
-        <p:nvSpPr>
-          <p:cNvPr id="3" name="Espace réservé du contenu 2"/>
+              <a:rPr lang="en-US" smtClean="0"/>
+              <a:t>Click to edit Master title style</a:t>
+            </a:r>
+            <a:endParaRPr lang="en-US" dirty="0"/>
+          </a:p>
+        </p:txBody>
+      </p:sp>
+      <p:sp>
+        <p:nvSpPr>
+          <p:cNvPr id="3" name="Content Placeholder 2"/>
           <p:cNvSpPr>
             <a:spLocks noGrp="1"/>
           </p:cNvSpPr>
@@ -706,44 +696,44 @@
           <a:p>
             <a:pPr lvl="0"/>
             <a:r>
-              <a:rPr lang="fr-FR" smtClean="0"/>
-              <a:t>Cliquez pour modifier les styles du texte du masque</a:t>
+              <a:rPr lang="en-US" smtClean="0"/>
+              <a:t>Click to edit Master text styles</a:t>
             </a:r>
           </a:p>
           <a:p>
             <a:pPr lvl="1"/>
             <a:r>
-              <a:rPr lang="fr-FR" smtClean="0"/>
-              <a:t>Deuxième niveau</a:t>
+              <a:rPr lang="en-US" smtClean="0"/>
+              <a:t>Second level</a:t>
             </a:r>
           </a:p>
           <a:p>
             <a:pPr lvl="2"/>
             <a:r>
-              <a:rPr lang="fr-FR" smtClean="0"/>
-              <a:t>Troisième niveau</a:t>
+              <a:rPr lang="en-US" smtClean="0"/>
+              <a:t>Third level</a:t>
             </a:r>
           </a:p>
           <a:p>
             <a:pPr lvl="3"/>
             <a:r>
-              <a:rPr lang="fr-FR" smtClean="0"/>
-              <a:t>Quatrième niveau</a:t>
+              <a:rPr lang="en-US" smtClean="0"/>
+              <a:t>Fourth level</a:t>
             </a:r>
           </a:p>
           <a:p>
             <a:pPr lvl="4"/>
             <a:r>
-              <a:rPr lang="fr-FR" smtClean="0"/>
-              <a:t>Cinquième niveau</a:t>
-            </a:r>
-            <a:endParaRPr lang="fr-FR"/>
-          </a:p>
-        </p:txBody>
-      </p:sp>
-      <p:sp>
-        <p:nvSpPr>
-          <p:cNvPr id="4" name="Espace réservé de la date 3"/>
+              <a:rPr lang="en-US" smtClean="0"/>
+              <a:t>Fifth level</a:t>
+            </a:r>
+            <a:endParaRPr lang="en-US" dirty="0"/>
+          </a:p>
+        </p:txBody>
+      </p:sp>
+      <p:sp>
+        <p:nvSpPr>
+          <p:cNvPr id="4" name="Date Placeholder 3"/>
           <p:cNvSpPr>
             <a:spLocks noGrp="1"/>
           </p:cNvSpPr>
@@ -758,7 +748,7 @@
           <a:p>
             <a:fld id="{016BF3B6-81B7-4E48-A8EE-448660641F47}" type="datetimeFigureOut">
               <a:rPr lang="fr-FR" smtClean="0"/>
-              <a:t>28/06/2018</a:t>
+              <a:t>29/06/2018</a:t>
             </a:fld>
             <a:endParaRPr lang="fr-FR"/>
           </a:p>
@@ -766,7 +756,7 @@
       </p:sp>
       <p:sp>
         <p:nvSpPr>
-          <p:cNvPr id="5" name="Espace réservé du pied de page 4"/>
+          <p:cNvPr id="5" name="Footer Placeholder 4"/>
           <p:cNvSpPr>
             <a:spLocks noGrp="1"/>
           </p:cNvSpPr>
@@ -785,7 +775,7 @@
       </p:sp>
       <p:sp>
         <p:nvSpPr>
-          <p:cNvPr id="6" name="Espace réservé du numéro de diapositive 5"/>
+          <p:cNvPr id="6" name="Slide Number Placeholder 5"/>
           <p:cNvSpPr>
             <a:spLocks noGrp="1"/>
           </p:cNvSpPr>
@@ -807,11 +797,6 @@
         </p:txBody>
       </p:sp>
     </p:spTree>
-    <p:extLst>
-      <p:ext uri="{BB962C8B-B14F-4D97-AF65-F5344CB8AC3E}">
-        <p14:creationId xmlns:p14="http://schemas.microsoft.com/office/powerpoint/2010/main" val="131187708"/>
-      </p:ext>
-    </p:extLst>
   </p:cSld>
   <p:clrMapOvr>
     <a:masterClrMapping/>
@@ -821,7 +806,7 @@
 
 <file path=ppt/slideLayouts/slideLayout3.xml><?xml version="1.0" encoding="utf-8"?>
 <p:sldLayout xmlns:a="http://schemas.openxmlformats.org/drawingml/2006/main" xmlns:r="http://schemas.openxmlformats.org/officeDocument/2006/relationships" xmlns:p="http://schemas.openxmlformats.org/presentationml/2006/main" type="secHead" preserve="1">
-  <p:cSld name="En-tête de section">
+  <p:cSld name="Section Header">
     <p:spTree>
       <p:nvGrpSpPr>
         <p:cNvPr id="1" name=""/>
@@ -838,7 +823,7 @@
       </p:grpSpPr>
       <p:sp>
         <p:nvSpPr>
-          <p:cNvPr id="2" name="Titre 1"/>
+          <p:cNvPr id="2" name="Title 1"/>
           <p:cNvSpPr>
             <a:spLocks noGrp="1"/>
           </p:cNvSpPr>
@@ -848,8 +833,8 @@
         </p:nvSpPr>
         <p:spPr>
           <a:xfrm>
-            <a:off x="831850" y="1709738"/>
-            <a:ext cx="10515600" cy="2852737"/>
+            <a:off x="1228170" y="1709739"/>
+            <a:ext cx="15525572" cy="2852737"/>
           </a:xfrm>
         </p:spPr>
         <p:txBody>
@@ -861,16 +846,16 @@
           </a:lstStyle>
           <a:p>
             <a:r>
-              <a:rPr lang="fr-FR" smtClean="0"/>
-              <a:t>Cliquez et modifiez le titre</a:t>
-            </a:r>
-            <a:endParaRPr lang="fr-FR"/>
-          </a:p>
-        </p:txBody>
-      </p:sp>
-      <p:sp>
-        <p:nvSpPr>
-          <p:cNvPr id="3" name="Espace réservé du texte 2"/>
+              <a:rPr lang="en-US" smtClean="0"/>
+              <a:t>Click to edit Master title style</a:t>
+            </a:r>
+            <a:endParaRPr lang="en-US" dirty="0"/>
+          </a:p>
+        </p:txBody>
+      </p:sp>
+      <p:sp>
+        <p:nvSpPr>
+          <p:cNvPr id="3" name="Text Placeholder 2"/>
           <p:cNvSpPr>
             <a:spLocks noGrp="1"/>
           </p:cNvSpPr>
@@ -880,8 +865,8 @@
         </p:nvSpPr>
         <p:spPr>
           <a:xfrm>
-            <a:off x="831850" y="4589463"/>
-            <a:ext cx="10515600" cy="1500187"/>
+            <a:off x="1228170" y="4589464"/>
+            <a:ext cx="15525572" cy="1500187"/>
           </a:xfrm>
         </p:spPr>
         <p:txBody>
@@ -981,15 +966,15 @@
           <a:p>
             <a:pPr lvl="0"/>
             <a:r>
-              <a:rPr lang="fr-FR" smtClean="0"/>
-              <a:t>Cliquez pour modifier les styles du texte du masque</a:t>
-            </a:r>
-          </a:p>
-        </p:txBody>
-      </p:sp>
-      <p:sp>
-        <p:nvSpPr>
-          <p:cNvPr id="4" name="Espace réservé de la date 3"/>
+              <a:rPr lang="en-US" smtClean="0"/>
+              <a:t>Click to edit Master text styles</a:t>
+            </a:r>
+          </a:p>
+        </p:txBody>
+      </p:sp>
+      <p:sp>
+        <p:nvSpPr>
+          <p:cNvPr id="4" name="Date Placeholder 3"/>
           <p:cNvSpPr>
             <a:spLocks noGrp="1"/>
           </p:cNvSpPr>
@@ -1004,7 +989,7 @@
           <a:p>
             <a:fld id="{016BF3B6-81B7-4E48-A8EE-448660641F47}" type="datetimeFigureOut">
               <a:rPr lang="fr-FR" smtClean="0"/>
-              <a:t>28/06/2018</a:t>
+              <a:t>29/06/2018</a:t>
             </a:fld>
             <a:endParaRPr lang="fr-FR"/>
           </a:p>
@@ -1012,7 +997,7 @@
       </p:sp>
       <p:sp>
         <p:nvSpPr>
-          <p:cNvPr id="5" name="Espace réservé du pied de page 4"/>
+          <p:cNvPr id="5" name="Footer Placeholder 4"/>
           <p:cNvSpPr>
             <a:spLocks noGrp="1"/>
           </p:cNvSpPr>
@@ -1031,7 +1016,7 @@
       </p:sp>
       <p:sp>
         <p:nvSpPr>
-          <p:cNvPr id="6" name="Espace réservé du numéro de diapositive 5"/>
+          <p:cNvPr id="6" name="Slide Number Placeholder 5"/>
           <p:cNvSpPr>
             <a:spLocks noGrp="1"/>
           </p:cNvSpPr>
@@ -1053,11 +1038,6 @@
         </p:txBody>
       </p:sp>
     </p:spTree>
-    <p:extLst>
-      <p:ext uri="{BB962C8B-B14F-4D97-AF65-F5344CB8AC3E}">
-        <p14:creationId xmlns:p14="http://schemas.microsoft.com/office/powerpoint/2010/main" val="1553586534"/>
-      </p:ext>
-    </p:extLst>
   </p:cSld>
   <p:clrMapOvr>
     <a:masterClrMapping/>
@@ -1067,7 +1047,7 @@
 
 <file path=ppt/slideLayouts/slideLayout4.xml><?xml version="1.0" encoding="utf-8"?>
 <p:sldLayout xmlns:a="http://schemas.openxmlformats.org/drawingml/2006/main" xmlns:r="http://schemas.openxmlformats.org/officeDocument/2006/relationships" xmlns:p="http://schemas.openxmlformats.org/presentationml/2006/main" type="twoObj" preserve="1">
-  <p:cSld name="Deux contenus">
+  <p:cSld name="Two Content">
     <p:spTree>
       <p:nvGrpSpPr>
         <p:cNvPr id="1" name=""/>
@@ -1084,7 +1064,7 @@
       </p:grpSpPr>
       <p:sp>
         <p:nvSpPr>
-          <p:cNvPr id="2" name="Titre 1"/>
+          <p:cNvPr id="2" name="Title 1"/>
           <p:cNvSpPr>
             <a:spLocks noGrp="1"/>
           </p:cNvSpPr>
@@ -1098,16 +1078,16 @@
           <a:lstStyle/>
           <a:p>
             <a:r>
-              <a:rPr lang="fr-FR" smtClean="0"/>
-              <a:t>Cliquez et modifiez le titre</a:t>
-            </a:r>
-            <a:endParaRPr lang="fr-FR"/>
-          </a:p>
-        </p:txBody>
-      </p:sp>
-      <p:sp>
-        <p:nvSpPr>
-          <p:cNvPr id="3" name="Espace réservé du contenu 2"/>
+              <a:rPr lang="en-US" smtClean="0"/>
+              <a:t>Click to edit Master title style</a:t>
+            </a:r>
+            <a:endParaRPr lang="en-US" dirty="0"/>
+          </a:p>
+        </p:txBody>
+      </p:sp>
+      <p:sp>
+        <p:nvSpPr>
+          <p:cNvPr id="3" name="Content Placeholder 2"/>
           <p:cNvSpPr>
             <a:spLocks noGrp="1"/>
           </p:cNvSpPr>
@@ -1117,8 +1097,8 @@
         </p:nvSpPr>
         <p:spPr>
           <a:xfrm>
-            <a:off x="838200" y="1825625"/>
-            <a:ext cx="5181600" cy="4351338"/>
+            <a:off x="1237545" y="1825625"/>
+            <a:ext cx="7650282" cy="4351338"/>
           </a:xfrm>
         </p:spPr>
         <p:txBody>
@@ -1127,44 +1107,44 @@
           <a:p>
             <a:pPr lvl="0"/>
             <a:r>
-              <a:rPr lang="fr-FR" smtClean="0"/>
-              <a:t>Cliquez pour modifier les styles du texte du masque</a:t>
+              <a:rPr lang="en-US" smtClean="0"/>
+              <a:t>Click to edit Master text styles</a:t>
             </a:r>
           </a:p>
           <a:p>
             <a:pPr lvl="1"/>
             <a:r>
-              <a:rPr lang="fr-FR" smtClean="0"/>
-              <a:t>Deuxième niveau</a:t>
+              <a:rPr lang="en-US" smtClean="0"/>
+              <a:t>Second level</a:t>
             </a:r>
           </a:p>
           <a:p>
             <a:pPr lvl="2"/>
             <a:r>
-              <a:rPr lang="fr-FR" smtClean="0"/>
-              <a:t>Troisième niveau</a:t>
+              <a:rPr lang="en-US" smtClean="0"/>
+              <a:t>Third level</a:t>
             </a:r>
           </a:p>
           <a:p>
             <a:pPr lvl="3"/>
             <a:r>
-              <a:rPr lang="fr-FR" smtClean="0"/>
-              <a:t>Quatrième niveau</a:t>
+              <a:rPr lang="en-US" smtClean="0"/>
+              <a:t>Fourth level</a:t>
             </a:r>
           </a:p>
           <a:p>
             <a:pPr lvl="4"/>
             <a:r>
-              <a:rPr lang="fr-FR" smtClean="0"/>
-              <a:t>Cinquième niveau</a:t>
-            </a:r>
-            <a:endParaRPr lang="fr-FR"/>
-          </a:p>
-        </p:txBody>
-      </p:sp>
-      <p:sp>
-        <p:nvSpPr>
-          <p:cNvPr id="4" name="Espace réservé du contenu 3"/>
+              <a:rPr lang="en-US" smtClean="0"/>
+              <a:t>Fifth level</a:t>
+            </a:r>
+            <a:endParaRPr lang="en-US" dirty="0"/>
+          </a:p>
+        </p:txBody>
+      </p:sp>
+      <p:sp>
+        <p:nvSpPr>
+          <p:cNvPr id="4" name="Content Placeholder 3"/>
           <p:cNvSpPr>
             <a:spLocks noGrp="1"/>
           </p:cNvSpPr>
@@ -1174,8 +1154,8 @@
         </p:nvSpPr>
         <p:spPr>
           <a:xfrm>
-            <a:off x="6172200" y="1825625"/>
-            <a:ext cx="5181600" cy="4351338"/>
+            <a:off x="9112836" y="1825625"/>
+            <a:ext cx="7650282" cy="4351338"/>
           </a:xfrm>
         </p:spPr>
         <p:txBody>
@@ -1184,44 +1164,44 @@
           <a:p>
             <a:pPr lvl="0"/>
             <a:r>
-              <a:rPr lang="fr-FR" smtClean="0"/>
-              <a:t>Cliquez pour modifier les styles du texte du masque</a:t>
+              <a:rPr lang="en-US" smtClean="0"/>
+              <a:t>Click to edit Master text styles</a:t>
             </a:r>
           </a:p>
           <a:p>
             <a:pPr lvl="1"/>
             <a:r>
-              <a:rPr lang="fr-FR" smtClean="0"/>
-              <a:t>Deuxième niveau</a:t>
+              <a:rPr lang="en-US" smtClean="0"/>
+              <a:t>Second level</a:t>
             </a:r>
           </a:p>
           <a:p>
             <a:pPr lvl="2"/>
             <a:r>
-              <a:rPr lang="fr-FR" smtClean="0"/>
-              <a:t>Troisième niveau</a:t>
+              <a:rPr lang="en-US" smtClean="0"/>
+              <a:t>Third level</a:t>
             </a:r>
           </a:p>
           <a:p>
             <a:pPr lvl="3"/>
             <a:r>
-              <a:rPr lang="fr-FR" smtClean="0"/>
-              <a:t>Quatrième niveau</a:t>
+              <a:rPr lang="en-US" smtClean="0"/>
+              <a:t>Fourth level</a:t>
             </a:r>
           </a:p>
           <a:p>
             <a:pPr lvl="4"/>
             <a:r>
-              <a:rPr lang="fr-FR" smtClean="0"/>
-              <a:t>Cinquième niveau</a:t>
-            </a:r>
-            <a:endParaRPr lang="fr-FR"/>
-          </a:p>
-        </p:txBody>
-      </p:sp>
-      <p:sp>
-        <p:nvSpPr>
-          <p:cNvPr id="5" name="Espace réservé de la date 4"/>
+              <a:rPr lang="en-US" smtClean="0"/>
+              <a:t>Fifth level</a:t>
+            </a:r>
+            <a:endParaRPr lang="en-US" dirty="0"/>
+          </a:p>
+        </p:txBody>
+      </p:sp>
+      <p:sp>
+        <p:nvSpPr>
+          <p:cNvPr id="5" name="Date Placeholder 4"/>
           <p:cNvSpPr>
             <a:spLocks noGrp="1"/>
           </p:cNvSpPr>
@@ -1236,7 +1216,7 @@
           <a:p>
             <a:fld id="{016BF3B6-81B7-4E48-A8EE-448660641F47}" type="datetimeFigureOut">
               <a:rPr lang="fr-FR" smtClean="0"/>
-              <a:t>28/06/2018</a:t>
+              <a:t>29/06/2018</a:t>
             </a:fld>
             <a:endParaRPr lang="fr-FR"/>
           </a:p>
@@ -1244,7 +1224,7 @@
       </p:sp>
       <p:sp>
         <p:nvSpPr>
-          <p:cNvPr id="6" name="Espace réservé du pied de page 5"/>
+          <p:cNvPr id="6" name="Footer Placeholder 5"/>
           <p:cNvSpPr>
             <a:spLocks noGrp="1"/>
           </p:cNvSpPr>
@@ -1263,7 +1243,7 @@
       </p:sp>
       <p:sp>
         <p:nvSpPr>
-          <p:cNvPr id="7" name="Espace réservé du numéro de diapositive 6"/>
+          <p:cNvPr id="7" name="Slide Number Placeholder 6"/>
           <p:cNvSpPr>
             <a:spLocks noGrp="1"/>
           </p:cNvSpPr>
@@ -1285,11 +1265,6 @@
         </p:txBody>
       </p:sp>
     </p:spTree>
-    <p:extLst>
-      <p:ext uri="{BB962C8B-B14F-4D97-AF65-F5344CB8AC3E}">
-        <p14:creationId xmlns:p14="http://schemas.microsoft.com/office/powerpoint/2010/main" val="2022696712"/>
-      </p:ext>
-    </p:extLst>
   </p:cSld>
   <p:clrMapOvr>
     <a:masterClrMapping/>
@@ -1299,7 +1274,7 @@
 
 <file path=ppt/slideLayouts/slideLayout5.xml><?xml version="1.0" encoding="utf-8"?>
 <p:sldLayout xmlns:a="http://schemas.openxmlformats.org/drawingml/2006/main" xmlns:r="http://schemas.openxmlformats.org/officeDocument/2006/relationships" xmlns:p="http://schemas.openxmlformats.org/presentationml/2006/main" type="twoTxTwoObj" preserve="1">
-  <p:cSld name="Comparaison">
+  <p:cSld name="Comparison">
     <p:spTree>
       <p:nvGrpSpPr>
         <p:cNvPr id="1" name=""/>
@@ -1316,7 +1291,7 @@
       </p:grpSpPr>
       <p:sp>
         <p:nvSpPr>
-          <p:cNvPr id="2" name="Titre 1"/>
+          <p:cNvPr id="2" name="Title 1"/>
           <p:cNvSpPr>
             <a:spLocks noGrp="1"/>
           </p:cNvSpPr>
@@ -1326,8 +1301,8 @@
         </p:nvSpPr>
         <p:spPr>
           <a:xfrm>
-            <a:off x="839788" y="365125"/>
-            <a:ext cx="10515600" cy="1325563"/>
+            <a:off x="1239890" y="365126"/>
+            <a:ext cx="15525572" cy="1325563"/>
           </a:xfrm>
         </p:spPr>
         <p:txBody>
@@ -1335,16 +1310,16 @@
           <a:lstStyle/>
           <a:p>
             <a:r>
-              <a:rPr lang="fr-FR" smtClean="0"/>
-              <a:t>Cliquez et modifiez le titre</a:t>
-            </a:r>
-            <a:endParaRPr lang="fr-FR"/>
-          </a:p>
-        </p:txBody>
-      </p:sp>
-      <p:sp>
-        <p:nvSpPr>
-          <p:cNvPr id="3" name="Espace réservé du texte 2"/>
+              <a:rPr lang="en-US" smtClean="0"/>
+              <a:t>Click to edit Master title style</a:t>
+            </a:r>
+            <a:endParaRPr lang="en-US" dirty="0"/>
+          </a:p>
+        </p:txBody>
+      </p:sp>
+      <p:sp>
+        <p:nvSpPr>
+          <p:cNvPr id="3" name="Text Placeholder 2"/>
           <p:cNvSpPr>
             <a:spLocks noGrp="1"/>
           </p:cNvSpPr>
@@ -1354,8 +1329,8 @@
         </p:nvSpPr>
         <p:spPr>
           <a:xfrm>
-            <a:off x="839788" y="1681163"/>
-            <a:ext cx="5157787" cy="823912"/>
+            <a:off x="1239891" y="1681163"/>
+            <a:ext cx="7615123" cy="823912"/>
           </a:xfrm>
         </p:spPr>
         <p:txBody>
@@ -1401,15 +1376,15 @@
           <a:p>
             <a:pPr lvl="0"/>
             <a:r>
-              <a:rPr lang="fr-FR" smtClean="0"/>
-              <a:t>Cliquez pour modifier les styles du texte du masque</a:t>
-            </a:r>
-          </a:p>
-        </p:txBody>
-      </p:sp>
-      <p:sp>
-        <p:nvSpPr>
-          <p:cNvPr id="4" name="Espace réservé du contenu 3"/>
+              <a:rPr lang="en-US" smtClean="0"/>
+              <a:t>Click to edit Master text styles</a:t>
+            </a:r>
+          </a:p>
+        </p:txBody>
+      </p:sp>
+      <p:sp>
+        <p:nvSpPr>
+          <p:cNvPr id="4" name="Content Placeholder 3"/>
           <p:cNvSpPr>
             <a:spLocks noGrp="1"/>
           </p:cNvSpPr>
@@ -1419,8 +1394,8 @@
         </p:nvSpPr>
         <p:spPr>
           <a:xfrm>
-            <a:off x="839788" y="2505075"/>
-            <a:ext cx="5157787" cy="3684588"/>
+            <a:off x="1239891" y="2505075"/>
+            <a:ext cx="7615123" cy="3684588"/>
           </a:xfrm>
         </p:spPr>
         <p:txBody>
@@ -1429,44 +1404,44 @@
           <a:p>
             <a:pPr lvl="0"/>
             <a:r>
-              <a:rPr lang="fr-FR" smtClean="0"/>
-              <a:t>Cliquez pour modifier les styles du texte du masque</a:t>
+              <a:rPr lang="en-US" smtClean="0"/>
+              <a:t>Click to edit Master text styles</a:t>
             </a:r>
           </a:p>
           <a:p>
             <a:pPr lvl="1"/>
             <a:r>
-              <a:rPr lang="fr-FR" smtClean="0"/>
-              <a:t>Deuxième niveau</a:t>
+              <a:rPr lang="en-US" smtClean="0"/>
+              <a:t>Second level</a:t>
             </a:r>
           </a:p>
           <a:p>
             <a:pPr lvl="2"/>
             <a:r>
-              <a:rPr lang="fr-FR" smtClean="0"/>
-              <a:t>Troisième niveau</a:t>
+              <a:rPr lang="en-US" smtClean="0"/>
+              <a:t>Third level</a:t>
             </a:r>
           </a:p>
           <a:p>
             <a:pPr lvl="3"/>
             <a:r>
-              <a:rPr lang="fr-FR" smtClean="0"/>
-              <a:t>Quatrième niveau</a:t>
+              <a:rPr lang="en-US" smtClean="0"/>
+              <a:t>Fourth level</a:t>
             </a:r>
           </a:p>
           <a:p>
             <a:pPr lvl="4"/>
             <a:r>
-              <a:rPr lang="fr-FR" smtClean="0"/>
-              <a:t>Cinquième niveau</a:t>
-            </a:r>
-            <a:endParaRPr lang="fr-FR"/>
-          </a:p>
-        </p:txBody>
-      </p:sp>
-      <p:sp>
-        <p:nvSpPr>
-          <p:cNvPr id="5" name="Espace réservé du texte 4"/>
+              <a:rPr lang="en-US" smtClean="0"/>
+              <a:t>Fifth level</a:t>
+            </a:r>
+            <a:endParaRPr lang="en-US" dirty="0"/>
+          </a:p>
+        </p:txBody>
+      </p:sp>
+      <p:sp>
+        <p:nvSpPr>
+          <p:cNvPr id="5" name="Text Placeholder 4"/>
           <p:cNvSpPr>
             <a:spLocks noGrp="1"/>
           </p:cNvSpPr>
@@ -1476,8 +1451,8 @@
         </p:nvSpPr>
         <p:spPr>
           <a:xfrm>
-            <a:off x="6172200" y="1681163"/>
-            <a:ext cx="5183188" cy="823912"/>
+            <a:off x="9112836" y="1681163"/>
+            <a:ext cx="7652626" cy="823912"/>
           </a:xfrm>
         </p:spPr>
         <p:txBody>
@@ -1523,15 +1498,15 @@
           <a:p>
             <a:pPr lvl="0"/>
             <a:r>
-              <a:rPr lang="fr-FR" smtClean="0"/>
-              <a:t>Cliquez pour modifier les styles du texte du masque</a:t>
-            </a:r>
-          </a:p>
-        </p:txBody>
-      </p:sp>
-      <p:sp>
-        <p:nvSpPr>
-          <p:cNvPr id="6" name="Espace réservé du contenu 5"/>
+              <a:rPr lang="en-US" smtClean="0"/>
+              <a:t>Click to edit Master text styles</a:t>
+            </a:r>
+          </a:p>
+        </p:txBody>
+      </p:sp>
+      <p:sp>
+        <p:nvSpPr>
+          <p:cNvPr id="6" name="Content Placeholder 5"/>
           <p:cNvSpPr>
             <a:spLocks noGrp="1"/>
           </p:cNvSpPr>
@@ -1541,8 +1516,8 @@
         </p:nvSpPr>
         <p:spPr>
           <a:xfrm>
-            <a:off x="6172200" y="2505075"/>
-            <a:ext cx="5183188" cy="3684588"/>
+            <a:off x="9112836" y="2505075"/>
+            <a:ext cx="7652626" cy="3684588"/>
           </a:xfrm>
         </p:spPr>
         <p:txBody>
@@ -1551,44 +1526,44 @@
           <a:p>
             <a:pPr lvl="0"/>
             <a:r>
-              <a:rPr lang="fr-FR" smtClean="0"/>
-              <a:t>Cliquez pour modifier les styles du texte du masque</a:t>
+              <a:rPr lang="en-US" smtClean="0"/>
+              <a:t>Click to edit Master text styles</a:t>
             </a:r>
           </a:p>
           <a:p>
             <a:pPr lvl="1"/>
             <a:r>
-              <a:rPr lang="fr-FR" smtClean="0"/>
-              <a:t>Deuxième niveau</a:t>
+              <a:rPr lang="en-US" smtClean="0"/>
+              <a:t>Second level</a:t>
             </a:r>
           </a:p>
           <a:p>
             <a:pPr lvl="2"/>
             <a:r>
-              <a:rPr lang="fr-FR" smtClean="0"/>
-              <a:t>Troisième niveau</a:t>
+              <a:rPr lang="en-US" smtClean="0"/>
+              <a:t>Third level</a:t>
             </a:r>
           </a:p>
           <a:p>
             <a:pPr lvl="3"/>
             <a:r>
-              <a:rPr lang="fr-FR" smtClean="0"/>
-              <a:t>Quatrième niveau</a:t>
+              <a:rPr lang="en-US" smtClean="0"/>
+              <a:t>Fourth level</a:t>
             </a:r>
           </a:p>
           <a:p>
             <a:pPr lvl="4"/>
             <a:r>
-              <a:rPr lang="fr-FR" smtClean="0"/>
-              <a:t>Cinquième niveau</a:t>
-            </a:r>
-            <a:endParaRPr lang="fr-FR"/>
-          </a:p>
-        </p:txBody>
-      </p:sp>
-      <p:sp>
-        <p:nvSpPr>
-          <p:cNvPr id="7" name="Espace réservé de la date 6"/>
+              <a:rPr lang="en-US" smtClean="0"/>
+              <a:t>Fifth level</a:t>
+            </a:r>
+            <a:endParaRPr lang="en-US" dirty="0"/>
+          </a:p>
+        </p:txBody>
+      </p:sp>
+      <p:sp>
+        <p:nvSpPr>
+          <p:cNvPr id="7" name="Date Placeholder 6"/>
           <p:cNvSpPr>
             <a:spLocks noGrp="1"/>
           </p:cNvSpPr>
@@ -1603,7 +1578,7 @@
           <a:p>
             <a:fld id="{016BF3B6-81B7-4E48-A8EE-448660641F47}" type="datetimeFigureOut">
               <a:rPr lang="fr-FR" smtClean="0"/>
-              <a:t>28/06/2018</a:t>
+              <a:t>29/06/2018</a:t>
             </a:fld>
             <a:endParaRPr lang="fr-FR"/>
           </a:p>
@@ -1611,7 +1586,7 @@
       </p:sp>
       <p:sp>
         <p:nvSpPr>
-          <p:cNvPr id="8" name="Espace réservé du pied de page 7"/>
+          <p:cNvPr id="8" name="Footer Placeholder 7"/>
           <p:cNvSpPr>
             <a:spLocks noGrp="1"/>
           </p:cNvSpPr>
@@ -1630,7 +1605,7 @@
       </p:sp>
       <p:sp>
         <p:nvSpPr>
-          <p:cNvPr id="9" name="Espace réservé du numéro de diapositive 8"/>
+          <p:cNvPr id="9" name="Slide Number Placeholder 8"/>
           <p:cNvSpPr>
             <a:spLocks noGrp="1"/>
           </p:cNvSpPr>
@@ -1652,11 +1627,6 @@
         </p:txBody>
       </p:sp>
     </p:spTree>
-    <p:extLst>
-      <p:ext uri="{BB962C8B-B14F-4D97-AF65-F5344CB8AC3E}">
-        <p14:creationId xmlns:p14="http://schemas.microsoft.com/office/powerpoint/2010/main" val="797506574"/>
-      </p:ext>
-    </p:extLst>
   </p:cSld>
   <p:clrMapOvr>
     <a:masterClrMapping/>
@@ -1666,7 +1636,7 @@
 
 <file path=ppt/slideLayouts/slideLayout6.xml><?xml version="1.0" encoding="utf-8"?>
 <p:sldLayout xmlns:a="http://schemas.openxmlformats.org/drawingml/2006/main" xmlns:r="http://schemas.openxmlformats.org/officeDocument/2006/relationships" xmlns:p="http://schemas.openxmlformats.org/presentationml/2006/main" type="titleOnly" preserve="1">
-  <p:cSld name="Titre seul">
+  <p:cSld name="Title Only">
     <p:spTree>
       <p:nvGrpSpPr>
         <p:cNvPr id="1" name=""/>
@@ -1683,7 +1653,7 @@
       </p:grpSpPr>
       <p:sp>
         <p:nvSpPr>
-          <p:cNvPr id="2" name="Titre 1"/>
+          <p:cNvPr id="2" name="Title 1"/>
           <p:cNvSpPr>
             <a:spLocks noGrp="1"/>
           </p:cNvSpPr>
@@ -1697,16 +1667,16 @@
           <a:lstStyle/>
           <a:p>
             <a:r>
-              <a:rPr lang="fr-FR" smtClean="0"/>
-              <a:t>Cliquez et modifiez le titre</a:t>
-            </a:r>
-            <a:endParaRPr lang="fr-FR"/>
-          </a:p>
-        </p:txBody>
-      </p:sp>
-      <p:sp>
-        <p:nvSpPr>
-          <p:cNvPr id="3" name="Espace réservé de la date 2"/>
+              <a:rPr lang="en-US" smtClean="0"/>
+              <a:t>Click to edit Master title style</a:t>
+            </a:r>
+            <a:endParaRPr lang="en-US" dirty="0"/>
+          </a:p>
+        </p:txBody>
+      </p:sp>
+      <p:sp>
+        <p:nvSpPr>
+          <p:cNvPr id="3" name="Date Placeholder 2"/>
           <p:cNvSpPr>
             <a:spLocks noGrp="1"/>
           </p:cNvSpPr>
@@ -1721,7 +1691,7 @@
           <a:p>
             <a:fld id="{016BF3B6-81B7-4E48-A8EE-448660641F47}" type="datetimeFigureOut">
               <a:rPr lang="fr-FR" smtClean="0"/>
-              <a:t>28/06/2018</a:t>
+              <a:t>29/06/2018</a:t>
             </a:fld>
             <a:endParaRPr lang="fr-FR"/>
           </a:p>
@@ -1729,7 +1699,7 @@
       </p:sp>
       <p:sp>
         <p:nvSpPr>
-          <p:cNvPr id="4" name="Espace réservé du pied de page 3"/>
+          <p:cNvPr id="4" name="Footer Placeholder 3"/>
           <p:cNvSpPr>
             <a:spLocks noGrp="1"/>
           </p:cNvSpPr>
@@ -1748,7 +1718,7 @@
       </p:sp>
       <p:sp>
         <p:nvSpPr>
-          <p:cNvPr id="5" name="Espace réservé du numéro de diapositive 4"/>
+          <p:cNvPr id="5" name="Slide Number Placeholder 4"/>
           <p:cNvSpPr>
             <a:spLocks noGrp="1"/>
           </p:cNvSpPr>
@@ -1770,11 +1740,6 @@
         </p:txBody>
       </p:sp>
     </p:spTree>
-    <p:extLst>
-      <p:ext uri="{BB962C8B-B14F-4D97-AF65-F5344CB8AC3E}">
-        <p14:creationId xmlns:p14="http://schemas.microsoft.com/office/powerpoint/2010/main" val="1247548291"/>
-      </p:ext>
-    </p:extLst>
   </p:cSld>
   <p:clrMapOvr>
     <a:masterClrMapping/>
@@ -1784,7 +1749,7 @@
 
 <file path=ppt/slideLayouts/slideLayout7.xml><?xml version="1.0" encoding="utf-8"?>
 <p:sldLayout xmlns:a="http://schemas.openxmlformats.org/drawingml/2006/main" xmlns:r="http://schemas.openxmlformats.org/officeDocument/2006/relationships" xmlns:p="http://schemas.openxmlformats.org/presentationml/2006/main" type="blank" preserve="1">
-  <p:cSld name="Vide">
+  <p:cSld name="Blank">
     <p:spTree>
       <p:nvGrpSpPr>
         <p:cNvPr id="1" name=""/>
@@ -1801,7 +1766,7 @@
       </p:grpSpPr>
       <p:sp>
         <p:nvSpPr>
-          <p:cNvPr id="2" name="Espace réservé de la date 1"/>
+          <p:cNvPr id="2" name="Date Placeholder 1"/>
           <p:cNvSpPr>
             <a:spLocks noGrp="1"/>
           </p:cNvSpPr>
@@ -1816,7 +1781,7 @@
           <a:p>
             <a:fld id="{016BF3B6-81B7-4E48-A8EE-448660641F47}" type="datetimeFigureOut">
               <a:rPr lang="fr-FR" smtClean="0"/>
-              <a:t>28/06/2018</a:t>
+              <a:t>29/06/2018</a:t>
             </a:fld>
             <a:endParaRPr lang="fr-FR"/>
           </a:p>
@@ -1824,7 +1789,7 @@
       </p:sp>
       <p:sp>
         <p:nvSpPr>
-          <p:cNvPr id="3" name="Espace réservé du pied de page 2"/>
+          <p:cNvPr id="3" name="Footer Placeholder 2"/>
           <p:cNvSpPr>
             <a:spLocks noGrp="1"/>
           </p:cNvSpPr>
@@ -1843,7 +1808,7 @@
       </p:sp>
       <p:sp>
         <p:nvSpPr>
-          <p:cNvPr id="4" name="Espace réservé du numéro de diapositive 3"/>
+          <p:cNvPr id="4" name="Slide Number Placeholder 3"/>
           <p:cNvSpPr>
             <a:spLocks noGrp="1"/>
           </p:cNvSpPr>
@@ -1865,11 +1830,6 @@
         </p:txBody>
       </p:sp>
     </p:spTree>
-    <p:extLst>
-      <p:ext uri="{BB962C8B-B14F-4D97-AF65-F5344CB8AC3E}">
-        <p14:creationId xmlns:p14="http://schemas.microsoft.com/office/powerpoint/2010/main" val="1661281176"/>
-      </p:ext>
-    </p:extLst>
   </p:cSld>
   <p:clrMapOvr>
     <a:masterClrMapping/>
@@ -1879,7 +1839,7 @@
 
 <file path=ppt/slideLayouts/slideLayout8.xml><?xml version="1.0" encoding="utf-8"?>
 <p:sldLayout xmlns:a="http://schemas.openxmlformats.org/drawingml/2006/main" xmlns:r="http://schemas.openxmlformats.org/officeDocument/2006/relationships" xmlns:p="http://schemas.openxmlformats.org/presentationml/2006/main" type="objTx" preserve="1">
-  <p:cSld name="Contenu avec légende">
+  <p:cSld name="Content with Caption">
     <p:spTree>
       <p:nvGrpSpPr>
         <p:cNvPr id="1" name=""/>
@@ -1896,7 +1856,7 @@
       </p:grpSpPr>
       <p:sp>
         <p:nvSpPr>
-          <p:cNvPr id="2" name="Titre 1"/>
+          <p:cNvPr id="2" name="Title 1"/>
           <p:cNvSpPr>
             <a:spLocks noGrp="1"/>
           </p:cNvSpPr>
@@ -1906,8 +1866,8 @@
         </p:nvSpPr>
         <p:spPr>
           <a:xfrm>
-            <a:off x="839788" y="457200"/>
-            <a:ext cx="3932237" cy="1600200"/>
+            <a:off x="1239891" y="457200"/>
+            <a:ext cx="5805682" cy="1600200"/>
           </a:xfrm>
         </p:spPr>
         <p:txBody>
@@ -1919,16 +1879,16 @@
           </a:lstStyle>
           <a:p>
             <a:r>
-              <a:rPr lang="fr-FR" smtClean="0"/>
-              <a:t>Cliquez et modifiez le titre</a:t>
-            </a:r>
-            <a:endParaRPr lang="fr-FR"/>
-          </a:p>
-        </p:txBody>
-      </p:sp>
-      <p:sp>
-        <p:nvSpPr>
-          <p:cNvPr id="3" name="Espace réservé du contenu 2"/>
+              <a:rPr lang="en-US" smtClean="0"/>
+              <a:t>Click to edit Master title style</a:t>
+            </a:r>
+            <a:endParaRPr lang="en-US" dirty="0"/>
+          </a:p>
+        </p:txBody>
+      </p:sp>
+      <p:sp>
+        <p:nvSpPr>
+          <p:cNvPr id="3" name="Content Placeholder 2"/>
           <p:cNvSpPr>
             <a:spLocks noGrp="1"/>
           </p:cNvSpPr>
@@ -1938,8 +1898,8 @@
         </p:nvSpPr>
         <p:spPr>
           <a:xfrm>
-            <a:off x="5183188" y="987425"/>
-            <a:ext cx="6172200" cy="4873625"/>
+            <a:off x="7652626" y="987426"/>
+            <a:ext cx="9112836" cy="4873625"/>
           </a:xfrm>
         </p:spPr>
         <p:txBody>
@@ -1976,44 +1936,44 @@
           <a:p>
             <a:pPr lvl="0"/>
             <a:r>
-              <a:rPr lang="fr-FR" smtClean="0"/>
-              <a:t>Cliquez pour modifier les styles du texte du masque</a:t>
+              <a:rPr lang="en-US" smtClean="0"/>
+              <a:t>Click to edit Master text styles</a:t>
             </a:r>
           </a:p>
           <a:p>
             <a:pPr lvl="1"/>
             <a:r>
-              <a:rPr lang="fr-FR" smtClean="0"/>
-              <a:t>Deuxième niveau</a:t>
+              <a:rPr lang="en-US" smtClean="0"/>
+              <a:t>Second level</a:t>
             </a:r>
           </a:p>
           <a:p>
             <a:pPr lvl="2"/>
             <a:r>
-              <a:rPr lang="fr-FR" smtClean="0"/>
-              <a:t>Troisième niveau</a:t>
+              <a:rPr lang="en-US" smtClean="0"/>
+              <a:t>Third level</a:t>
             </a:r>
           </a:p>
           <a:p>
             <a:pPr lvl="3"/>
             <a:r>
-              <a:rPr lang="fr-FR" smtClean="0"/>
-              <a:t>Quatrième niveau</a:t>
+              <a:rPr lang="en-US" smtClean="0"/>
+              <a:t>Fourth level</a:t>
             </a:r>
           </a:p>
           <a:p>
             <a:pPr lvl="4"/>
             <a:r>
-              <a:rPr lang="fr-FR" smtClean="0"/>
-              <a:t>Cinquième niveau</a:t>
-            </a:r>
-            <a:endParaRPr lang="fr-FR"/>
-          </a:p>
-        </p:txBody>
-      </p:sp>
-      <p:sp>
-        <p:nvSpPr>
-          <p:cNvPr id="4" name="Espace réservé du texte 3"/>
+              <a:rPr lang="en-US" smtClean="0"/>
+              <a:t>Fifth level</a:t>
+            </a:r>
+            <a:endParaRPr lang="en-US" dirty="0"/>
+          </a:p>
+        </p:txBody>
+      </p:sp>
+      <p:sp>
+        <p:nvSpPr>
+          <p:cNvPr id="4" name="Text Placeholder 3"/>
           <p:cNvSpPr>
             <a:spLocks noGrp="1"/>
           </p:cNvSpPr>
@@ -2023,8 +1983,8 @@
         </p:nvSpPr>
         <p:spPr>
           <a:xfrm>
-            <a:off x="839788" y="2057400"/>
-            <a:ext cx="3932237" cy="3811588"/>
+            <a:off x="1239891" y="2057400"/>
+            <a:ext cx="5805682" cy="3811588"/>
           </a:xfrm>
         </p:spPr>
         <p:txBody>
@@ -2070,15 +2030,15 @@
           <a:p>
             <a:pPr lvl="0"/>
             <a:r>
-              <a:rPr lang="fr-FR" smtClean="0"/>
-              <a:t>Cliquez pour modifier les styles du texte du masque</a:t>
-            </a:r>
-          </a:p>
-        </p:txBody>
-      </p:sp>
-      <p:sp>
-        <p:nvSpPr>
-          <p:cNvPr id="5" name="Espace réservé de la date 4"/>
+              <a:rPr lang="en-US" smtClean="0"/>
+              <a:t>Click to edit Master text styles</a:t>
+            </a:r>
+          </a:p>
+        </p:txBody>
+      </p:sp>
+      <p:sp>
+        <p:nvSpPr>
+          <p:cNvPr id="5" name="Date Placeholder 4"/>
           <p:cNvSpPr>
             <a:spLocks noGrp="1"/>
           </p:cNvSpPr>
@@ -2093,7 +2053,7 @@
           <a:p>
             <a:fld id="{016BF3B6-81B7-4E48-A8EE-448660641F47}" type="datetimeFigureOut">
               <a:rPr lang="fr-FR" smtClean="0"/>
-              <a:t>28/06/2018</a:t>
+              <a:t>29/06/2018</a:t>
             </a:fld>
             <a:endParaRPr lang="fr-FR"/>
           </a:p>
@@ -2101,7 +2061,7 @@
       </p:sp>
       <p:sp>
         <p:nvSpPr>
-          <p:cNvPr id="6" name="Espace réservé du pied de page 5"/>
+          <p:cNvPr id="6" name="Footer Placeholder 5"/>
           <p:cNvSpPr>
             <a:spLocks noGrp="1"/>
           </p:cNvSpPr>
@@ -2120,7 +2080,7 @@
       </p:sp>
       <p:sp>
         <p:nvSpPr>
-          <p:cNvPr id="7" name="Espace réservé du numéro de diapositive 6"/>
+          <p:cNvPr id="7" name="Slide Number Placeholder 6"/>
           <p:cNvSpPr>
             <a:spLocks noGrp="1"/>
           </p:cNvSpPr>
@@ -2142,11 +2102,6 @@
         </p:txBody>
       </p:sp>
     </p:spTree>
-    <p:extLst>
-      <p:ext uri="{BB962C8B-B14F-4D97-AF65-F5344CB8AC3E}">
-        <p14:creationId xmlns:p14="http://schemas.microsoft.com/office/powerpoint/2010/main" val="1717830385"/>
-      </p:ext>
-    </p:extLst>
   </p:cSld>
   <p:clrMapOvr>
     <a:masterClrMapping/>
@@ -2156,7 +2111,7 @@
 
 <file path=ppt/slideLayouts/slideLayout9.xml><?xml version="1.0" encoding="utf-8"?>
 <p:sldLayout xmlns:a="http://schemas.openxmlformats.org/drawingml/2006/main" xmlns:r="http://schemas.openxmlformats.org/officeDocument/2006/relationships" xmlns:p="http://schemas.openxmlformats.org/presentationml/2006/main" type="picTx" preserve="1">
-  <p:cSld name="Image avec légende">
+  <p:cSld name="Picture with Caption">
     <p:spTree>
       <p:nvGrpSpPr>
         <p:cNvPr id="1" name=""/>
@@ -2173,7 +2128,7 @@
       </p:grpSpPr>
       <p:sp>
         <p:nvSpPr>
-          <p:cNvPr id="2" name="Titre 1"/>
+          <p:cNvPr id="2" name="Title 1"/>
           <p:cNvSpPr>
             <a:spLocks noGrp="1"/>
           </p:cNvSpPr>
@@ -2183,8 +2138,8 @@
         </p:nvSpPr>
         <p:spPr>
           <a:xfrm>
-            <a:off x="839788" y="457200"/>
-            <a:ext cx="3932237" cy="1600200"/>
+            <a:off x="1239891" y="457200"/>
+            <a:ext cx="5805682" cy="1600200"/>
           </a:xfrm>
         </p:spPr>
         <p:txBody>
@@ -2196,18 +2151,18 @@
           </a:lstStyle>
           <a:p>
             <a:r>
-              <a:rPr lang="fr-FR" smtClean="0"/>
-              <a:t>Cliquez et modifiez le titre</a:t>
-            </a:r>
-            <a:endParaRPr lang="fr-FR"/>
-          </a:p>
-        </p:txBody>
-      </p:sp>
-      <p:sp>
-        <p:nvSpPr>
-          <p:cNvPr id="3" name="Espace réservé pour une image  2"/>
-          <p:cNvSpPr>
-            <a:spLocks noGrp="1"/>
+              <a:rPr lang="en-US" smtClean="0"/>
+              <a:t>Click to edit Master title style</a:t>
+            </a:r>
+            <a:endParaRPr lang="en-US" dirty="0"/>
+          </a:p>
+        </p:txBody>
+      </p:sp>
+      <p:sp>
+        <p:nvSpPr>
+          <p:cNvPr id="3" name="Picture Placeholder 2"/>
+          <p:cNvSpPr>
+            <a:spLocks noGrp="1" noChangeAspect="1"/>
           </p:cNvSpPr>
           <p:nvPr>
             <p:ph type="pic" idx="1"/>
@@ -2215,12 +2170,12 @@
         </p:nvSpPr>
         <p:spPr>
           <a:xfrm>
-            <a:off x="5183188" y="987425"/>
-            <a:ext cx="6172200" cy="4873625"/>
+            <a:off x="7652626" y="987426"/>
+            <a:ext cx="9112836" cy="4873625"/>
           </a:xfrm>
         </p:spPr>
         <p:txBody>
-          <a:bodyPr/>
+          <a:bodyPr anchor="t"/>
           <a:lstStyle>
             <a:lvl1pPr marL="0" indent="0">
               <a:buNone/>
@@ -2260,13 +2215,17 @@
             </a:lvl9pPr>
           </a:lstStyle>
           <a:p>
-            <a:endParaRPr lang="fr-FR"/>
-          </a:p>
-        </p:txBody>
-      </p:sp>
-      <p:sp>
-        <p:nvSpPr>
-          <p:cNvPr id="4" name="Espace réservé du texte 3"/>
+            <a:r>
+              <a:rPr lang="en-US" smtClean="0"/>
+              <a:t>Drag picture to placeholder or click icon to add</a:t>
+            </a:r>
+            <a:endParaRPr lang="en-US" dirty="0"/>
+          </a:p>
+        </p:txBody>
+      </p:sp>
+      <p:sp>
+        <p:nvSpPr>
+          <p:cNvPr id="4" name="Text Placeholder 3"/>
           <p:cNvSpPr>
             <a:spLocks noGrp="1"/>
           </p:cNvSpPr>
@@ -2276,8 +2235,8 @@
         </p:nvSpPr>
         <p:spPr>
           <a:xfrm>
-            <a:off x="839788" y="2057400"/>
-            <a:ext cx="3932237" cy="3811588"/>
+            <a:off x="1239891" y="2057400"/>
+            <a:ext cx="5805682" cy="3811588"/>
           </a:xfrm>
         </p:spPr>
         <p:txBody>
@@ -2323,15 +2282,15 @@
           <a:p>
             <a:pPr lvl="0"/>
             <a:r>
-              <a:rPr lang="fr-FR" smtClean="0"/>
-              <a:t>Cliquez pour modifier les styles du texte du masque</a:t>
-            </a:r>
-          </a:p>
-        </p:txBody>
-      </p:sp>
-      <p:sp>
-        <p:nvSpPr>
-          <p:cNvPr id="5" name="Espace réservé de la date 4"/>
+              <a:rPr lang="en-US" smtClean="0"/>
+              <a:t>Click to edit Master text styles</a:t>
+            </a:r>
+          </a:p>
+        </p:txBody>
+      </p:sp>
+      <p:sp>
+        <p:nvSpPr>
+          <p:cNvPr id="5" name="Date Placeholder 4"/>
           <p:cNvSpPr>
             <a:spLocks noGrp="1"/>
           </p:cNvSpPr>
@@ -2346,7 +2305,7 @@
           <a:p>
             <a:fld id="{016BF3B6-81B7-4E48-A8EE-448660641F47}" type="datetimeFigureOut">
               <a:rPr lang="fr-FR" smtClean="0"/>
-              <a:t>28/06/2018</a:t>
+              <a:t>29/06/2018</a:t>
             </a:fld>
             <a:endParaRPr lang="fr-FR"/>
           </a:p>
@@ -2354,7 +2313,7 @@
       </p:sp>
       <p:sp>
         <p:nvSpPr>
-          <p:cNvPr id="6" name="Espace réservé du pied de page 5"/>
+          <p:cNvPr id="6" name="Footer Placeholder 5"/>
           <p:cNvSpPr>
             <a:spLocks noGrp="1"/>
           </p:cNvSpPr>
@@ -2373,7 +2332,7 @@
       </p:sp>
       <p:sp>
         <p:nvSpPr>
-          <p:cNvPr id="7" name="Espace réservé du numéro de diapositive 6"/>
+          <p:cNvPr id="7" name="Slide Number Placeholder 6"/>
           <p:cNvSpPr>
             <a:spLocks noGrp="1"/>
           </p:cNvSpPr>
@@ -2395,11 +2354,6 @@
         </p:txBody>
       </p:sp>
     </p:spTree>
-    <p:extLst>
-      <p:ext uri="{BB962C8B-B14F-4D97-AF65-F5344CB8AC3E}">
-        <p14:creationId xmlns:p14="http://schemas.microsoft.com/office/powerpoint/2010/main" val="805130427"/>
-      </p:ext>
-    </p:extLst>
   </p:cSld>
   <p:clrMapOvr>
     <a:masterClrMapping/>
@@ -2431,7 +2385,7 @@
       </p:grpSpPr>
       <p:sp>
         <p:nvSpPr>
-          <p:cNvPr id="2" name="Espace réservé du titre 1"/>
+          <p:cNvPr id="2" name="Title Placeholder 1"/>
           <p:cNvSpPr>
             <a:spLocks noGrp="1"/>
           </p:cNvSpPr>
@@ -2441,8 +2395,8 @@
         </p:nvSpPr>
         <p:spPr>
           <a:xfrm>
-            <a:off x="838200" y="365125"/>
-            <a:ext cx="10515600" cy="1325563"/>
+            <a:off x="1237546" y="365126"/>
+            <a:ext cx="15525572" cy="1325563"/>
           </a:xfrm>
           <a:prstGeom prst="rect">
             <a:avLst/>
@@ -2455,16 +2409,16 @@
           <a:lstStyle/>
           <a:p>
             <a:r>
-              <a:rPr lang="fr-FR" smtClean="0"/>
-              <a:t>Cliquez et modifiez le titre</a:t>
-            </a:r>
-            <a:endParaRPr lang="fr-FR"/>
-          </a:p>
-        </p:txBody>
-      </p:sp>
-      <p:sp>
-        <p:nvSpPr>
-          <p:cNvPr id="3" name="Espace réservé du texte 2"/>
+              <a:rPr lang="en-US" smtClean="0"/>
+              <a:t>Click to edit Master title style</a:t>
+            </a:r>
+            <a:endParaRPr lang="en-US" dirty="0"/>
+          </a:p>
+        </p:txBody>
+      </p:sp>
+      <p:sp>
+        <p:nvSpPr>
+          <p:cNvPr id="3" name="Text Placeholder 2"/>
           <p:cNvSpPr>
             <a:spLocks noGrp="1"/>
           </p:cNvSpPr>
@@ -2474,8 +2428,8 @@
         </p:nvSpPr>
         <p:spPr>
           <a:xfrm>
-            <a:off x="838200" y="1825625"/>
-            <a:ext cx="10515600" cy="4351338"/>
+            <a:off x="1237546" y="1825625"/>
+            <a:ext cx="15525572" cy="4351338"/>
           </a:xfrm>
           <a:prstGeom prst="rect">
             <a:avLst/>
@@ -2489,44 +2443,44 @@
           <a:p>
             <a:pPr lvl="0"/>
             <a:r>
-              <a:rPr lang="fr-FR" smtClean="0"/>
-              <a:t>Cliquez pour modifier les styles du texte du masque</a:t>
+              <a:rPr lang="en-US" smtClean="0"/>
+              <a:t>Click to edit Master text styles</a:t>
             </a:r>
           </a:p>
           <a:p>
             <a:pPr lvl="1"/>
             <a:r>
-              <a:rPr lang="fr-FR" smtClean="0"/>
-              <a:t>Deuxième niveau</a:t>
+              <a:rPr lang="en-US" smtClean="0"/>
+              <a:t>Second level</a:t>
             </a:r>
           </a:p>
           <a:p>
             <a:pPr lvl="2"/>
             <a:r>
-              <a:rPr lang="fr-FR" smtClean="0"/>
-              <a:t>Troisième niveau</a:t>
+              <a:rPr lang="en-US" smtClean="0"/>
+              <a:t>Third level</a:t>
             </a:r>
           </a:p>
           <a:p>
             <a:pPr lvl="3"/>
             <a:r>
-              <a:rPr lang="fr-FR" smtClean="0"/>
-              <a:t>Quatrième niveau</a:t>
+              <a:rPr lang="en-US" smtClean="0"/>
+              <a:t>Fourth level</a:t>
             </a:r>
           </a:p>
           <a:p>
             <a:pPr lvl="4"/>
             <a:r>
-              <a:rPr lang="fr-FR" smtClean="0"/>
-              <a:t>Cinquième niveau</a:t>
-            </a:r>
-            <a:endParaRPr lang="fr-FR"/>
-          </a:p>
-        </p:txBody>
-      </p:sp>
-      <p:sp>
-        <p:nvSpPr>
-          <p:cNvPr id="4" name="Espace réservé de la date 3"/>
+              <a:rPr lang="en-US" smtClean="0"/>
+              <a:t>Fifth level</a:t>
+            </a:r>
+            <a:endParaRPr lang="en-US" dirty="0"/>
+          </a:p>
+        </p:txBody>
+      </p:sp>
+      <p:sp>
+        <p:nvSpPr>
+          <p:cNvPr id="4" name="Date Placeholder 3"/>
           <p:cNvSpPr>
             <a:spLocks noGrp="1"/>
           </p:cNvSpPr>
@@ -2536,8 +2490,8 @@
         </p:nvSpPr>
         <p:spPr>
           <a:xfrm>
-            <a:off x="838200" y="6356350"/>
-            <a:ext cx="2743200" cy="365125"/>
+            <a:off x="1237546" y="6356351"/>
+            <a:ext cx="4050149" cy="365125"/>
           </a:xfrm>
           <a:prstGeom prst="rect">
             <a:avLst/>
@@ -2559,7 +2513,7 @@
           <a:p>
             <a:fld id="{016BF3B6-81B7-4E48-A8EE-448660641F47}" type="datetimeFigureOut">
               <a:rPr lang="fr-FR" smtClean="0"/>
-              <a:t>28/06/2018</a:t>
+              <a:t>29/06/2018</a:t>
             </a:fld>
             <a:endParaRPr lang="fr-FR"/>
           </a:p>
@@ -2567,7 +2521,7 @@
       </p:sp>
       <p:sp>
         <p:nvSpPr>
-          <p:cNvPr id="5" name="Espace réservé du pied de page 4"/>
+          <p:cNvPr id="5" name="Footer Placeholder 4"/>
           <p:cNvSpPr>
             <a:spLocks noGrp="1"/>
           </p:cNvSpPr>
@@ -2577,8 +2531,8 @@
         </p:nvSpPr>
         <p:spPr>
           <a:xfrm>
-            <a:off x="4038600" y="6356350"/>
-            <a:ext cx="4114800" cy="365125"/>
+            <a:off x="5962720" y="6356351"/>
+            <a:ext cx="6075224" cy="365125"/>
           </a:xfrm>
           <a:prstGeom prst="rect">
             <a:avLst/>
@@ -2604,7 +2558,7 @@
       </p:sp>
       <p:sp>
         <p:nvSpPr>
-          <p:cNvPr id="6" name="Espace réservé du numéro de diapositive 5"/>
+          <p:cNvPr id="6" name="Slide Number Placeholder 5"/>
           <p:cNvSpPr>
             <a:spLocks noGrp="1"/>
           </p:cNvSpPr>
@@ -2614,8 +2568,8 @@
         </p:nvSpPr>
         <p:spPr>
           <a:xfrm>
-            <a:off x="8610600" y="6356350"/>
-            <a:ext cx="2743200" cy="365125"/>
+            <a:off x="12712968" y="6356351"/>
+            <a:ext cx="4050149" cy="365125"/>
           </a:xfrm>
           <a:prstGeom prst="rect">
             <a:avLst/>
@@ -2646,23 +2600,23 @@
     </p:spTree>
     <p:extLst>
       <p:ext uri="{BB962C8B-B14F-4D97-AF65-F5344CB8AC3E}">
-        <p14:creationId xmlns:p14="http://schemas.microsoft.com/office/powerpoint/2010/main" val="792594780"/>
+        <p14:creationId xmlns:p14="http://schemas.microsoft.com/office/powerpoint/2010/main" val="2141997379"/>
       </p:ext>
     </p:extLst>
   </p:cSld>
   <p:clrMap bg1="lt1" tx1="dk1" bg2="lt2" tx2="dk2" accent1="accent1" accent2="accent2" accent3="accent3" accent4="accent4" accent5="accent5" accent6="accent6" hlink="hlink" folHlink="folHlink"/>
   <p:sldLayoutIdLst>
-    <p:sldLayoutId id="2147483649" r:id="rId1"/>
-    <p:sldLayoutId id="2147483650" r:id="rId2"/>
-    <p:sldLayoutId id="2147483651" r:id="rId3"/>
-    <p:sldLayoutId id="2147483652" r:id="rId4"/>
-    <p:sldLayoutId id="2147483653" r:id="rId5"/>
-    <p:sldLayoutId id="2147483654" r:id="rId6"/>
-    <p:sldLayoutId id="2147483655" r:id="rId7"/>
-    <p:sldLayoutId id="2147483656" r:id="rId8"/>
-    <p:sldLayoutId id="2147483657" r:id="rId9"/>
-    <p:sldLayoutId id="2147483658" r:id="rId10"/>
-    <p:sldLayoutId id="2147483659" r:id="rId11"/>
+    <p:sldLayoutId id="2147483673" r:id="rId1"/>
+    <p:sldLayoutId id="2147483674" r:id="rId2"/>
+    <p:sldLayoutId id="2147483675" r:id="rId3"/>
+    <p:sldLayoutId id="2147483676" r:id="rId4"/>
+    <p:sldLayoutId id="2147483677" r:id="rId5"/>
+    <p:sldLayoutId id="2147483678" r:id="rId6"/>
+    <p:sldLayoutId id="2147483679" r:id="rId7"/>
+    <p:sldLayoutId id="2147483680" r:id="rId8"/>
+    <p:sldLayoutId id="2147483681" r:id="rId9"/>
+    <p:sldLayoutId id="2147483682" r:id="rId10"/>
+    <p:sldLayoutId id="2147483683" r:id="rId11"/>
   </p:sldLayoutIdLst>
   <p:txStyles>
     <p:titleStyle>
@@ -2692,7 +2646,7 @@
         <a:spcBef>
           <a:spcPts val="1000"/>
         </a:spcBef>
-        <a:buFont typeface="Arial"/>
+        <a:buFont typeface="Arial" panose="020B0604020202020204" pitchFamily="34" charset="0"/>
         <a:buChar char="•"/>
         <a:defRPr sz="2800" kern="1200">
           <a:solidFill>
@@ -2710,7 +2664,7 @@
         <a:spcBef>
           <a:spcPts val="500"/>
         </a:spcBef>
-        <a:buFont typeface="Arial"/>
+        <a:buFont typeface="Arial" panose="020B0604020202020204" pitchFamily="34" charset="0"/>
         <a:buChar char="•"/>
         <a:defRPr sz="2400" kern="1200">
           <a:solidFill>
@@ -2728,7 +2682,7 @@
         <a:spcBef>
           <a:spcPts val="500"/>
         </a:spcBef>
-        <a:buFont typeface="Arial"/>
+        <a:buFont typeface="Arial" panose="020B0604020202020204" pitchFamily="34" charset="0"/>
         <a:buChar char="•"/>
         <a:defRPr sz="2000" kern="1200">
           <a:solidFill>
@@ -2746,7 +2700,7 @@
         <a:spcBef>
           <a:spcPts val="500"/>
         </a:spcBef>
-        <a:buFont typeface="Arial"/>
+        <a:buFont typeface="Arial" panose="020B0604020202020204" pitchFamily="34" charset="0"/>
         <a:buChar char="•"/>
         <a:defRPr sz="1800" kern="1200">
           <a:solidFill>
@@ -2764,7 +2718,7 @@
         <a:spcBef>
           <a:spcPts val="500"/>
         </a:spcBef>
-        <a:buFont typeface="Arial"/>
+        <a:buFont typeface="Arial" panose="020B0604020202020204" pitchFamily="34" charset="0"/>
         <a:buChar char="•"/>
         <a:defRPr sz="1800" kern="1200">
           <a:solidFill>
@@ -2782,7 +2736,7 @@
         <a:spcBef>
           <a:spcPts val="500"/>
         </a:spcBef>
-        <a:buFont typeface="Arial"/>
+        <a:buFont typeface="Arial" panose="020B0604020202020204" pitchFamily="34" charset="0"/>
         <a:buChar char="•"/>
         <a:defRPr sz="1800" kern="1200">
           <a:solidFill>
@@ -2800,7 +2754,7 @@
         <a:spcBef>
           <a:spcPts val="500"/>
         </a:spcBef>
-        <a:buFont typeface="Arial"/>
+        <a:buFont typeface="Arial" panose="020B0604020202020204" pitchFamily="34" charset="0"/>
         <a:buChar char="•"/>
         <a:defRPr sz="1800" kern="1200">
           <a:solidFill>
@@ -2818,7 +2772,7 @@
         <a:spcBef>
           <a:spcPts val="500"/>
         </a:spcBef>
-        <a:buFont typeface="Arial"/>
+        <a:buFont typeface="Arial" panose="020B0604020202020204" pitchFamily="34" charset="0"/>
         <a:buChar char="•"/>
         <a:defRPr sz="1800" kern="1200">
           <a:solidFill>
@@ -2836,7 +2790,7 @@
         <a:spcBef>
           <a:spcPts val="500"/>
         </a:spcBef>
-        <a:buFont typeface="Arial"/>
+        <a:buFont typeface="Arial" panose="020B0604020202020204" pitchFamily="34" charset="0"/>
         <a:buChar char="•"/>
         <a:defRPr sz="1800" kern="1200">
           <a:solidFill>
@@ -2850,7 +2804,7 @@
     </p:bodyStyle>
     <p:otherStyle>
       <a:defPPr>
-        <a:defRPr lang="fr-FR"/>
+        <a:defRPr lang="en-US"/>
       </a:defPPr>
       <a:lvl1pPr marL="0" algn="l" defTabSz="914400" rtl="0" eaLnBrk="1" latinLnBrk="0" hangingPunct="1">
         <a:defRPr sz="1800" kern="1200">
@@ -2987,8 +2941,8 @@
         </p:blipFill>
         <p:spPr>
           <a:xfrm>
-            <a:off x="-176815" y="684485"/>
-            <a:ext cx="12368815" cy="5937031"/>
+            <a:off x="-1930400" y="-2269934"/>
+            <a:ext cx="21488400" cy="9360115"/>
           </a:xfrm>
           <a:prstGeom prst="rect">
             <a:avLst/>
@@ -3011,7 +2965,7 @@
 <file path=ppt/theme/theme1.xml><?xml version="1.0" encoding="utf-8"?>
 <a:theme xmlns:a="http://schemas.openxmlformats.org/drawingml/2006/main" name="Thème Office">
   <a:themeElements>
-    <a:clrScheme name="Bureau">
+    <a:clrScheme name="Office Theme">
       <a:dk1>
         <a:sysClr val="windowText" lastClr="000000"/>
       </a:dk1>
@@ -3025,7 +2979,7 @@
         <a:srgbClr val="E7E6E6"/>
       </a:lt2>
       <a:accent1>
-        <a:srgbClr val="5B9BD5"/>
+        <a:srgbClr val="4472C4"/>
       </a:accent1>
       <a:accent2>
         <a:srgbClr val="ED7D31"/>
@@ -3037,7 +2991,7 @@
         <a:srgbClr val="FFC000"/>
       </a:accent4>
       <a:accent5>
-        <a:srgbClr val="4472C4"/>
+        <a:srgbClr val="5B9BD5"/>
       </a:accent5>
       <a:accent6>
         <a:srgbClr val="70AD47"/>
@@ -3049,14 +3003,14 @@
         <a:srgbClr val="954F72"/>
       </a:folHlink>
     </a:clrScheme>
-    <a:fontScheme name="Bureau">
+    <a:fontScheme name="Office Theme">
       <a:majorFont>
         <a:latin typeface="Calibri Light" panose="020F0302020204030204"/>
         <a:ea typeface=""/>
         <a:cs typeface=""/>
-        <a:font script="Jpan" typeface="ＭＳ Ｐゴシック"/>
+        <a:font script="Jpan" typeface="游ゴシック Light"/>
         <a:font script="Hang" typeface="맑은 고딕"/>
-        <a:font script="Hans" typeface="宋体"/>
+        <a:font script="Hans" typeface="等线 Light"/>
         <a:font script="Hant" typeface="新細明體"/>
         <a:font script="Arab" typeface="Times New Roman"/>
         <a:font script="Hebr" typeface="Times New Roman"/>
@@ -3089,9 +3043,9 @@
         <a:latin typeface="Calibri" panose="020F0502020204030204"/>
         <a:ea typeface=""/>
         <a:cs typeface=""/>
-        <a:font script="Jpan" typeface="ＭＳ Ｐゴシック"/>
+        <a:font script="Jpan" typeface="游ゴシック"/>
         <a:font script="Hang" typeface="맑은 고딕"/>
-        <a:font script="Hans" typeface="宋体"/>
+        <a:font script="Hans" typeface="等线"/>
         <a:font script="Hant" typeface="新細明體"/>
         <a:font script="Arab" typeface="Arial"/>
         <a:font script="Hebr" typeface="Arial"/>
@@ -3121,7 +3075,7 @@
         <a:font script="Geor" typeface="Sylfaen"/>
       </a:minorFont>
     </a:fontScheme>
-    <a:fmtScheme name="Bureau">
+    <a:fmtScheme name="Office Theme">
       <a:fillStyleLst>
         <a:solidFill>
           <a:schemeClr val="phClr"/>

</xml_diff>